<commit_message>
Fixed Elusive pathing angle bug.
</commit_message>
<xml_diff>
--- a/A World Apart Pitch.pptx
+++ b/A World Apart Pitch.pptx
@@ -171,7 +171,7 @@
           <a:noFill/>
           <a:extLst>
             <a:ext uri="{909E8E84-426E-40dd-AFC4-6F175D3DCCD1}">
-              <a14:hiddenFill xmlns="" xmlns:a14="http://schemas.microsoft.com/office/drawing/2010/main">
+              <a14:hiddenFill xmlns:a14="http://schemas.microsoft.com/office/drawing/2010/main" xmlns="">
                 <a:solidFill>
                   <a:srgbClr val="FFFFFF"/>
                 </a:solidFill>
@@ -231,7 +231,7 @@
             </a:ln>
             <a:extLst>
               <a:ext uri="{91240B29-F687-4f45-9708-019B960494DF}">
-                <a14:hiddenLine xmlns="" xmlns:a14="http://schemas.microsoft.com/office/drawing/2010/main" w="9525">
+                <a14:hiddenLine xmlns:a14="http://schemas.microsoft.com/office/drawing/2010/main" xmlns="" w="9525">
                   <a:solidFill>
                     <a:srgbClr val="000000"/>
                   </a:solidFill>
@@ -321,7 +321,7 @@
             </a:ln>
             <a:extLst>
               <a:ext uri="{91240B29-F687-4f45-9708-019B960494DF}">
-                <a14:hiddenLine xmlns="" xmlns:a14="http://schemas.microsoft.com/office/drawing/2010/main" w="9525">
+                <a14:hiddenLine xmlns:a14="http://schemas.microsoft.com/office/drawing/2010/main" xmlns="" w="9525">
                   <a:solidFill>
                     <a:srgbClr val="000000"/>
                   </a:solidFill>
@@ -411,7 +411,7 @@
             </a:ln>
             <a:extLst>
               <a:ext uri="{91240B29-F687-4f45-9708-019B960494DF}">
-                <a14:hiddenLine xmlns="" xmlns:a14="http://schemas.microsoft.com/office/drawing/2010/main" w="9525">
+                <a14:hiddenLine xmlns:a14="http://schemas.microsoft.com/office/drawing/2010/main" xmlns="" w="9525">
                   <a:solidFill>
                     <a:srgbClr val="000000"/>
                   </a:solidFill>
@@ -445,7 +445,7 @@
             </a:ln>
             <a:extLst>
               <a:ext uri="{91240B29-F687-4f45-9708-019B960494DF}">
-                <a14:hiddenLine xmlns="" xmlns:a14="http://schemas.microsoft.com/office/drawing/2010/main" w="9525">
+                <a14:hiddenLine xmlns:a14="http://schemas.microsoft.com/office/drawing/2010/main" xmlns="" w="9525">
                   <a:solidFill>
                     <a:srgbClr val="000000"/>
                   </a:solidFill>
@@ -535,7 +535,7 @@
             </a:ln>
             <a:extLst>
               <a:ext uri="{91240B29-F687-4f45-9708-019B960494DF}">
-                <a14:hiddenLine xmlns="" xmlns:a14="http://schemas.microsoft.com/office/drawing/2010/main" w="9525">
+                <a14:hiddenLine xmlns:a14="http://schemas.microsoft.com/office/drawing/2010/main" xmlns="" w="9525">
                   <a:solidFill>
                     <a:srgbClr val="000000"/>
                   </a:solidFill>
@@ -597,7 +597,7 @@
             </a:ln>
             <a:extLst>
               <a:ext uri="{91240B29-F687-4f45-9708-019B960494DF}">
-                <a14:hiddenLine xmlns="" xmlns:a14="http://schemas.microsoft.com/office/drawing/2010/main" w="9525">
+                <a14:hiddenLine xmlns:a14="http://schemas.microsoft.com/office/drawing/2010/main" xmlns="" w="9525">
                   <a:solidFill>
                     <a:srgbClr val="000000"/>
                   </a:solidFill>
@@ -659,7 +659,7 @@
             </a:ln>
             <a:extLst>
               <a:ext uri="{91240B29-F687-4f45-9708-019B960494DF}">
-                <a14:hiddenLine xmlns="" xmlns:a14="http://schemas.microsoft.com/office/drawing/2010/main" w="9525">
+                <a14:hiddenLine xmlns:a14="http://schemas.microsoft.com/office/drawing/2010/main" xmlns="" w="9525">
                   <a:solidFill>
                     <a:srgbClr val="000000"/>
                   </a:solidFill>
@@ -749,7 +749,7 @@
             </a:ln>
             <a:extLst>
               <a:ext uri="{91240B29-F687-4f45-9708-019B960494DF}">
-                <a14:hiddenLine xmlns="" xmlns:a14="http://schemas.microsoft.com/office/drawing/2010/main" w="9525">
+                <a14:hiddenLine xmlns:a14="http://schemas.microsoft.com/office/drawing/2010/main" xmlns="" w="9525">
                   <a:solidFill>
                     <a:srgbClr val="000000"/>
                   </a:solidFill>
@@ -811,7 +811,7 @@
             </a:ln>
             <a:extLst>
               <a:ext uri="{91240B29-F687-4f45-9708-019B960494DF}">
-                <a14:hiddenLine xmlns="" xmlns:a14="http://schemas.microsoft.com/office/drawing/2010/main" w="9525">
+                <a14:hiddenLine xmlns:a14="http://schemas.microsoft.com/office/drawing/2010/main" xmlns="" w="9525">
                   <a:solidFill>
                     <a:srgbClr val="000000"/>
                   </a:solidFill>
@@ -873,7 +873,7 @@
             </a:ln>
             <a:extLst>
               <a:ext uri="{91240B29-F687-4f45-9708-019B960494DF}">
-                <a14:hiddenLine xmlns="" xmlns:a14="http://schemas.microsoft.com/office/drawing/2010/main" w="9525">
+                <a14:hiddenLine xmlns:a14="http://schemas.microsoft.com/office/drawing/2010/main" xmlns="" w="9525">
                   <a:solidFill>
                     <a:srgbClr val="000000"/>
                   </a:solidFill>
@@ -963,7 +963,7 @@
             </a:ln>
             <a:extLst>
               <a:ext uri="{91240B29-F687-4f45-9708-019B960494DF}">
-                <a14:hiddenLine xmlns="" xmlns:a14="http://schemas.microsoft.com/office/drawing/2010/main" w="9525">
+                <a14:hiddenLine xmlns:a14="http://schemas.microsoft.com/office/drawing/2010/main" xmlns="" w="9525">
                   <a:solidFill>
                     <a:srgbClr val="000000"/>
                   </a:solidFill>
@@ -1053,7 +1053,7 @@
             </a:ln>
             <a:extLst>
               <a:ext uri="{91240B29-F687-4f45-9708-019B960494DF}">
-                <a14:hiddenLine xmlns="" xmlns:a14="http://schemas.microsoft.com/office/drawing/2010/main" w="9525">
+                <a14:hiddenLine xmlns:a14="http://schemas.microsoft.com/office/drawing/2010/main" xmlns="" w="9525">
                   <a:solidFill>
                     <a:srgbClr val="000000"/>
                   </a:solidFill>
@@ -1115,7 +1115,7 @@
             </a:ln>
             <a:extLst>
               <a:ext uri="{91240B29-F687-4f45-9708-019B960494DF}">
-                <a14:hiddenLine xmlns="" xmlns:a14="http://schemas.microsoft.com/office/drawing/2010/main" w="9525">
+                <a14:hiddenLine xmlns:a14="http://schemas.microsoft.com/office/drawing/2010/main" xmlns="" w="9525">
                   <a:solidFill>
                     <a:srgbClr val="000000"/>
                   </a:solidFill>
@@ -1225,7 +1225,7 @@
             </a:ln>
             <a:extLst>
               <a:ext uri="{91240B29-F687-4f45-9708-019B960494DF}">
-                <a14:hiddenLine xmlns="" xmlns:a14="http://schemas.microsoft.com/office/drawing/2010/main" w="9525">
+                <a14:hiddenLine xmlns:a14="http://schemas.microsoft.com/office/drawing/2010/main" xmlns="" w="9525">
                   <a:solidFill>
                     <a:srgbClr val="000000"/>
                   </a:solidFill>
@@ -1287,7 +1287,7 @@
             </a:ln>
             <a:extLst>
               <a:ext uri="{91240B29-F687-4f45-9708-019B960494DF}">
-                <a14:hiddenLine xmlns="" xmlns:a14="http://schemas.microsoft.com/office/drawing/2010/main" w="9525">
+                <a14:hiddenLine xmlns:a14="http://schemas.microsoft.com/office/drawing/2010/main" xmlns="" w="9525">
                   <a:solidFill>
                     <a:srgbClr val="000000"/>
                   </a:solidFill>
@@ -1377,7 +1377,7 @@
             </a:ln>
             <a:extLst>
               <a:ext uri="{91240B29-F687-4f45-9708-019B960494DF}">
-                <a14:hiddenLine xmlns="" xmlns:a14="http://schemas.microsoft.com/office/drawing/2010/main" w="9525">
+                <a14:hiddenLine xmlns:a14="http://schemas.microsoft.com/office/drawing/2010/main" xmlns="" w="9525">
                   <a:solidFill>
                     <a:srgbClr val="000000"/>
                   </a:solidFill>
@@ -1467,7 +1467,7 @@
             </a:ln>
             <a:extLst>
               <a:ext uri="{91240B29-F687-4f45-9708-019B960494DF}">
-                <a14:hiddenLine xmlns="" xmlns:a14="http://schemas.microsoft.com/office/drawing/2010/main" w="9525">
+                <a14:hiddenLine xmlns:a14="http://schemas.microsoft.com/office/drawing/2010/main" xmlns="" w="9525">
                   <a:solidFill>
                     <a:srgbClr val="000000"/>
                   </a:solidFill>
@@ -1529,7 +1529,7 @@
             </a:ln>
             <a:extLst>
               <a:ext uri="{91240B29-F687-4f45-9708-019B960494DF}">
-                <a14:hiddenLine xmlns="" xmlns:a14="http://schemas.microsoft.com/office/drawing/2010/main" w="9525">
+                <a14:hiddenLine xmlns:a14="http://schemas.microsoft.com/office/drawing/2010/main" xmlns="" w="9525">
                   <a:solidFill>
                     <a:srgbClr val="000000"/>
                   </a:solidFill>
@@ -1619,7 +1619,7 @@
             </a:ln>
             <a:extLst>
               <a:ext uri="{91240B29-F687-4f45-9708-019B960494DF}">
-                <a14:hiddenLine xmlns="" xmlns:a14="http://schemas.microsoft.com/office/drawing/2010/main" w="9525">
+                <a14:hiddenLine xmlns:a14="http://schemas.microsoft.com/office/drawing/2010/main" xmlns="" w="9525">
                   <a:solidFill>
                     <a:srgbClr val="000000"/>
                   </a:solidFill>
@@ -1709,7 +1709,7 @@
             </a:ln>
             <a:extLst>
               <a:ext uri="{91240B29-F687-4f45-9708-019B960494DF}">
-                <a14:hiddenLine xmlns="" xmlns:a14="http://schemas.microsoft.com/office/drawing/2010/main" w="9525">
+                <a14:hiddenLine xmlns:a14="http://schemas.microsoft.com/office/drawing/2010/main" xmlns="" w="9525">
                   <a:solidFill>
                     <a:srgbClr val="000000"/>
                   </a:solidFill>
@@ -1765,7 +1765,7 @@
             </a:ln>
             <a:extLst>
               <a:ext uri="{91240B29-F687-4f45-9708-019B960494DF}">
-                <a14:hiddenLine xmlns="" xmlns:a14="http://schemas.microsoft.com/office/drawing/2010/main" w="9525">
+                <a14:hiddenLine xmlns:a14="http://schemas.microsoft.com/office/drawing/2010/main" xmlns="" w="9525">
                   <a:solidFill>
                     <a:srgbClr val="000000"/>
                   </a:solidFill>
@@ -1855,7 +1855,7 @@
             </a:ln>
             <a:extLst>
               <a:ext uri="{91240B29-F687-4f45-9708-019B960494DF}">
-                <a14:hiddenLine xmlns="" xmlns:a14="http://schemas.microsoft.com/office/drawing/2010/main" w="9525">
+                <a14:hiddenLine xmlns:a14="http://schemas.microsoft.com/office/drawing/2010/main" xmlns="" w="9525">
                   <a:solidFill>
                     <a:srgbClr val="000000"/>
                   </a:solidFill>
@@ -1911,7 +1911,7 @@
             </a:ln>
             <a:extLst>
               <a:ext uri="{91240B29-F687-4f45-9708-019B960494DF}">
-                <a14:hiddenLine xmlns="" xmlns:a14="http://schemas.microsoft.com/office/drawing/2010/main" w="9525">
+                <a14:hiddenLine xmlns:a14="http://schemas.microsoft.com/office/drawing/2010/main" xmlns="" w="9525">
                   <a:solidFill>
                     <a:srgbClr val="000000"/>
                   </a:solidFill>
@@ -2001,7 +2001,7 @@
             </a:ln>
             <a:extLst>
               <a:ext uri="{91240B29-F687-4f45-9708-019B960494DF}">
-                <a14:hiddenLine xmlns="" xmlns:a14="http://schemas.microsoft.com/office/drawing/2010/main" w="9525">
+                <a14:hiddenLine xmlns:a14="http://schemas.microsoft.com/office/drawing/2010/main" xmlns="" w="9525">
                   <a:solidFill>
                     <a:srgbClr val="000000"/>
                   </a:solidFill>
@@ -2069,7 +2069,7 @@
             </a:ln>
             <a:extLst>
               <a:ext uri="{91240B29-F687-4f45-9708-019B960494DF}">
-                <a14:hiddenLine xmlns="" xmlns:a14="http://schemas.microsoft.com/office/drawing/2010/main" w="9525">
+                <a14:hiddenLine xmlns:a14="http://schemas.microsoft.com/office/drawing/2010/main" xmlns="" w="9525">
                   <a:solidFill>
                     <a:srgbClr val="000000"/>
                   </a:solidFill>
@@ -2159,7 +2159,7 @@
             </a:ln>
             <a:extLst>
               <a:ext uri="{91240B29-F687-4f45-9708-019B960494DF}">
-                <a14:hiddenLine xmlns="" xmlns:a14="http://schemas.microsoft.com/office/drawing/2010/main" w="9525">
+                <a14:hiddenLine xmlns:a14="http://schemas.microsoft.com/office/drawing/2010/main" xmlns="" w="9525">
                   <a:solidFill>
                     <a:srgbClr val="000000"/>
                   </a:solidFill>
@@ -2227,7 +2227,7 @@
             </a:ln>
             <a:extLst>
               <a:ext uri="{91240B29-F687-4f45-9708-019B960494DF}">
-                <a14:hiddenLine xmlns="" xmlns:a14="http://schemas.microsoft.com/office/drawing/2010/main" w="9525">
+                <a14:hiddenLine xmlns:a14="http://schemas.microsoft.com/office/drawing/2010/main" xmlns="" w="9525">
                   <a:solidFill>
                     <a:srgbClr val="000000"/>
                   </a:solidFill>
@@ -2317,7 +2317,7 @@
             </a:ln>
             <a:extLst>
               <a:ext uri="{91240B29-F687-4f45-9708-019B960494DF}">
-                <a14:hiddenLine xmlns="" xmlns:a14="http://schemas.microsoft.com/office/drawing/2010/main" w="9525">
+                <a14:hiddenLine xmlns:a14="http://schemas.microsoft.com/office/drawing/2010/main" xmlns="" w="9525">
                   <a:solidFill>
                     <a:srgbClr val="000000"/>
                   </a:solidFill>
@@ -2351,7 +2351,7 @@
             </a:ln>
             <a:extLst>
               <a:ext uri="{91240B29-F687-4f45-9708-019B960494DF}">
-                <a14:hiddenLine xmlns="" xmlns:a14="http://schemas.microsoft.com/office/drawing/2010/main" w="9525">
+                <a14:hiddenLine xmlns:a14="http://schemas.microsoft.com/office/drawing/2010/main" xmlns="" w="9525">
                   <a:solidFill>
                     <a:srgbClr val="000000"/>
                   </a:solidFill>
@@ -2441,7 +2441,7 @@
             </a:ln>
             <a:extLst>
               <a:ext uri="{91240B29-F687-4f45-9708-019B960494DF}">
-                <a14:hiddenLine xmlns="" xmlns:a14="http://schemas.microsoft.com/office/drawing/2010/main" w="9525">
+                <a14:hiddenLine xmlns:a14="http://schemas.microsoft.com/office/drawing/2010/main" xmlns="" w="9525">
                   <a:solidFill>
                     <a:srgbClr val="000000"/>
                   </a:solidFill>
@@ -2503,7 +2503,7 @@
             </a:ln>
             <a:extLst>
               <a:ext uri="{91240B29-F687-4f45-9708-019B960494DF}">
-                <a14:hiddenLine xmlns="" xmlns:a14="http://schemas.microsoft.com/office/drawing/2010/main" w="9525">
+                <a14:hiddenLine xmlns:a14="http://schemas.microsoft.com/office/drawing/2010/main" xmlns="" w="9525">
                   <a:solidFill>
                     <a:srgbClr val="000000"/>
                   </a:solidFill>
@@ -2565,7 +2565,7 @@
             </a:ln>
             <a:extLst>
               <a:ext uri="{91240B29-F687-4f45-9708-019B960494DF}">
-                <a14:hiddenLine xmlns="" xmlns:a14="http://schemas.microsoft.com/office/drawing/2010/main" w="9525">
+                <a14:hiddenLine xmlns:a14="http://schemas.microsoft.com/office/drawing/2010/main" xmlns="" w="9525">
                   <a:solidFill>
                     <a:srgbClr val="000000"/>
                   </a:solidFill>
@@ -2655,7 +2655,7 @@
             </a:ln>
             <a:extLst>
               <a:ext uri="{91240B29-F687-4f45-9708-019B960494DF}">
-                <a14:hiddenLine xmlns="" xmlns:a14="http://schemas.microsoft.com/office/drawing/2010/main" w="9525">
+                <a14:hiddenLine xmlns:a14="http://schemas.microsoft.com/office/drawing/2010/main" xmlns="" w="9525">
                   <a:solidFill>
                     <a:srgbClr val="000000"/>
                   </a:solidFill>
@@ -2723,7 +2723,7 @@
             </a:ln>
             <a:extLst>
               <a:ext uri="{91240B29-F687-4f45-9708-019B960494DF}">
-                <a14:hiddenLine xmlns="" xmlns:a14="http://schemas.microsoft.com/office/drawing/2010/main" w="9525">
+                <a14:hiddenLine xmlns:a14="http://schemas.microsoft.com/office/drawing/2010/main" xmlns="" w="9525">
                   <a:solidFill>
                     <a:srgbClr val="000000"/>
                   </a:solidFill>
@@ -2785,7 +2785,7 @@
             </a:ln>
             <a:extLst>
               <a:ext uri="{91240B29-F687-4f45-9708-019B960494DF}">
-                <a14:hiddenLine xmlns="" xmlns:a14="http://schemas.microsoft.com/office/drawing/2010/main" w="9525">
+                <a14:hiddenLine xmlns:a14="http://schemas.microsoft.com/office/drawing/2010/main" xmlns="" w="9525">
                   <a:solidFill>
                     <a:srgbClr val="000000"/>
                   </a:solidFill>
@@ -2875,7 +2875,7 @@
             </a:ln>
             <a:extLst>
               <a:ext uri="{91240B29-F687-4f45-9708-019B960494DF}">
-                <a14:hiddenLine xmlns="" xmlns:a14="http://schemas.microsoft.com/office/drawing/2010/main" w="9525">
+                <a14:hiddenLine xmlns:a14="http://schemas.microsoft.com/office/drawing/2010/main" xmlns="" w="9525">
                   <a:solidFill>
                     <a:srgbClr val="000000"/>
                   </a:solidFill>
@@ -2937,7 +2937,7 @@
             </a:ln>
             <a:extLst>
               <a:ext uri="{91240B29-F687-4f45-9708-019B960494DF}">
-                <a14:hiddenLine xmlns="" xmlns:a14="http://schemas.microsoft.com/office/drawing/2010/main" w="9525">
+                <a14:hiddenLine xmlns:a14="http://schemas.microsoft.com/office/drawing/2010/main" xmlns="" w="9525">
                   <a:solidFill>
                     <a:srgbClr val="000000"/>
                   </a:solidFill>
@@ -3027,7 +3027,7 @@
             </a:ln>
             <a:extLst>
               <a:ext uri="{91240B29-F687-4f45-9708-019B960494DF}">
-                <a14:hiddenLine xmlns="" xmlns:a14="http://schemas.microsoft.com/office/drawing/2010/main" w="9525">
+                <a14:hiddenLine xmlns:a14="http://schemas.microsoft.com/office/drawing/2010/main" xmlns="" w="9525">
                   <a:solidFill>
                     <a:srgbClr val="000000"/>
                   </a:solidFill>
@@ -3089,7 +3089,7 @@
             </a:ln>
             <a:extLst>
               <a:ext uri="{91240B29-F687-4f45-9708-019B960494DF}">
-                <a14:hiddenLine xmlns="" xmlns:a14="http://schemas.microsoft.com/office/drawing/2010/main" w="9525">
+                <a14:hiddenLine xmlns:a14="http://schemas.microsoft.com/office/drawing/2010/main" xmlns="" w="9525">
                   <a:solidFill>
                     <a:srgbClr val="000000"/>
                   </a:solidFill>
@@ -3179,7 +3179,7 @@
             </a:ln>
             <a:extLst>
               <a:ext uri="{91240B29-F687-4f45-9708-019B960494DF}">
-                <a14:hiddenLine xmlns="" xmlns:a14="http://schemas.microsoft.com/office/drawing/2010/main" w="9525">
+                <a14:hiddenLine xmlns:a14="http://schemas.microsoft.com/office/drawing/2010/main" xmlns="" w="9525">
                   <a:solidFill>
                     <a:srgbClr val="000000"/>
                   </a:solidFill>
@@ -3213,7 +3213,7 @@
             </a:ln>
             <a:extLst>
               <a:ext uri="{91240B29-F687-4f45-9708-019B960494DF}">
-                <a14:hiddenLine xmlns="" xmlns:a14="http://schemas.microsoft.com/office/drawing/2010/main" w="9525">
+                <a14:hiddenLine xmlns:a14="http://schemas.microsoft.com/office/drawing/2010/main" xmlns="" w="9525">
                   <a:solidFill>
                     <a:srgbClr val="000000"/>
                   </a:solidFill>
@@ -3278,7 +3278,7 @@
             </a:ln>
             <a:extLst>
               <a:ext uri="{91240B29-F687-4f45-9708-019B960494DF}">
-                <a14:hiddenLine xmlns="" xmlns:a14="http://schemas.microsoft.com/office/drawing/2010/main" w="9525">
+                <a14:hiddenLine xmlns:a14="http://schemas.microsoft.com/office/drawing/2010/main" xmlns="" w="9525">
                   <a:solidFill>
                     <a:srgbClr val="000000"/>
                   </a:solidFill>
@@ -3368,7 +3368,7 @@
             </a:ln>
             <a:extLst>
               <a:ext uri="{91240B29-F687-4f45-9708-019B960494DF}">
-                <a14:hiddenLine xmlns="" xmlns:a14="http://schemas.microsoft.com/office/drawing/2010/main" w="9525">
+                <a14:hiddenLine xmlns:a14="http://schemas.microsoft.com/office/drawing/2010/main" xmlns="" w="9525">
                   <a:solidFill>
                     <a:srgbClr val="000000"/>
                   </a:solidFill>
@@ -3430,7 +3430,7 @@
             </a:ln>
             <a:extLst>
               <a:ext uri="{91240B29-F687-4f45-9708-019B960494DF}">
-                <a14:hiddenLine xmlns="" xmlns:a14="http://schemas.microsoft.com/office/drawing/2010/main" w="9525">
+                <a14:hiddenLine xmlns:a14="http://schemas.microsoft.com/office/drawing/2010/main" xmlns="" w="9525">
                   <a:solidFill>
                     <a:srgbClr val="000000"/>
                   </a:solidFill>
@@ -3520,7 +3520,7 @@
             </a:ln>
             <a:extLst>
               <a:ext uri="{91240B29-F687-4f45-9708-019B960494DF}">
-                <a14:hiddenLine xmlns="" xmlns:a14="http://schemas.microsoft.com/office/drawing/2010/main" w="9525">
+                <a14:hiddenLine xmlns:a14="http://schemas.microsoft.com/office/drawing/2010/main" xmlns="" w="9525">
                   <a:solidFill>
                     <a:srgbClr val="000000"/>
                   </a:solidFill>
@@ -3610,7 +3610,7 @@
             </a:ln>
             <a:extLst>
               <a:ext uri="{91240B29-F687-4f45-9708-019B960494DF}">
-                <a14:hiddenLine xmlns="" xmlns:a14="http://schemas.microsoft.com/office/drawing/2010/main" w="9525">
+                <a14:hiddenLine xmlns:a14="http://schemas.microsoft.com/office/drawing/2010/main" xmlns="" w="9525">
                   <a:solidFill>
                     <a:srgbClr val="000000"/>
                   </a:solidFill>
@@ -3675,7 +3675,7 @@
             </a:ln>
             <a:extLst>
               <a:ext uri="{91240B29-F687-4f45-9708-019B960494DF}">
-                <a14:hiddenLine xmlns="" xmlns:a14="http://schemas.microsoft.com/office/drawing/2010/main" w="9525">
+                <a14:hiddenLine xmlns:a14="http://schemas.microsoft.com/office/drawing/2010/main" xmlns="" w="9525">
                   <a:solidFill>
                     <a:srgbClr val="000000"/>
                   </a:solidFill>
@@ -3737,7 +3737,7 @@
             </a:ln>
             <a:extLst>
               <a:ext uri="{91240B29-F687-4f45-9708-019B960494DF}">
-                <a14:hiddenLine xmlns="" xmlns:a14="http://schemas.microsoft.com/office/drawing/2010/main" w="9525">
+                <a14:hiddenLine xmlns:a14="http://schemas.microsoft.com/office/drawing/2010/main" xmlns="" w="9525">
                   <a:solidFill>
                     <a:srgbClr val="000000"/>
                   </a:solidFill>
@@ -3827,7 +3827,7 @@
             </a:ln>
             <a:extLst>
               <a:ext uri="{91240B29-F687-4f45-9708-019B960494DF}">
-                <a14:hiddenLine xmlns="" xmlns:a14="http://schemas.microsoft.com/office/drawing/2010/main" w="9525">
+                <a14:hiddenLine xmlns:a14="http://schemas.microsoft.com/office/drawing/2010/main" xmlns="" w="9525">
                   <a:solidFill>
                     <a:srgbClr val="000000"/>
                   </a:solidFill>
@@ -3917,7 +3917,7 @@
             </a:ln>
             <a:extLst>
               <a:ext uri="{91240B29-F687-4f45-9708-019B960494DF}">
-                <a14:hiddenLine xmlns="" xmlns:a14="http://schemas.microsoft.com/office/drawing/2010/main" w="9525">
+                <a14:hiddenLine xmlns:a14="http://schemas.microsoft.com/office/drawing/2010/main" xmlns="" w="9525">
                   <a:solidFill>
                     <a:srgbClr val="000000"/>
                   </a:solidFill>
@@ -3979,7 +3979,7 @@
             </a:ln>
             <a:extLst>
               <a:ext uri="{91240B29-F687-4f45-9708-019B960494DF}">
-                <a14:hiddenLine xmlns="" xmlns:a14="http://schemas.microsoft.com/office/drawing/2010/main" w="9525">
+                <a14:hiddenLine xmlns:a14="http://schemas.microsoft.com/office/drawing/2010/main" xmlns="" w="9525">
                   <a:solidFill>
                     <a:srgbClr val="000000"/>
                   </a:solidFill>
@@ -4099,7 +4099,7 @@
             </a:ln>
             <a:extLst>
               <a:ext uri="{91240B29-F687-4f45-9708-019B960494DF}">
-                <a14:hiddenLine xmlns="" xmlns:a14="http://schemas.microsoft.com/office/drawing/2010/main" w="9525">
+                <a14:hiddenLine xmlns:a14="http://schemas.microsoft.com/office/drawing/2010/main" xmlns="" w="9525">
                   <a:solidFill>
                     <a:srgbClr val="000000"/>
                   </a:solidFill>
@@ -4167,7 +4167,7 @@
             </a:ln>
             <a:extLst>
               <a:ext uri="{91240B29-F687-4f45-9708-019B960494DF}">
-                <a14:hiddenLine xmlns="" xmlns:a14="http://schemas.microsoft.com/office/drawing/2010/main" w="9525">
+                <a14:hiddenLine xmlns:a14="http://schemas.microsoft.com/office/drawing/2010/main" xmlns="" w="9525">
                   <a:solidFill>
                     <a:srgbClr val="000000"/>
                   </a:solidFill>
@@ -4257,7 +4257,7 @@
             </a:ln>
             <a:extLst>
               <a:ext uri="{91240B29-F687-4f45-9708-019B960494DF}">
-                <a14:hiddenLine xmlns="" xmlns:a14="http://schemas.microsoft.com/office/drawing/2010/main" w="9525">
+                <a14:hiddenLine xmlns:a14="http://schemas.microsoft.com/office/drawing/2010/main" xmlns="" w="9525">
                   <a:solidFill>
                     <a:srgbClr val="000000"/>
                   </a:solidFill>
@@ -4397,7 +4397,7 @@
           <a:p>
             <a:fld id="{48A87A34-81AB-432B-8DAE-1953F412C126}" type="datetimeFigureOut">
               <a:rPr lang="en-US" dirty="0"/>
-              <a:t>10/15/2017</a:t>
+              <a:t>10/16/2017</a:t>
             </a:fld>
             <a:endParaRPr lang="en-US" dirty="0"/>
           </a:p>
@@ -4659,7 +4659,7 @@
           <a:p>
             <a:fld id="{48A87A34-81AB-432B-8DAE-1953F412C126}" type="datetimeFigureOut">
               <a:rPr lang="en-US" dirty="0"/>
-              <a:t>10/15/2017</a:t>
+              <a:t>10/16/2017</a:t>
             </a:fld>
             <a:endParaRPr lang="en-US" dirty="0"/>
           </a:p>
@@ -4850,7 +4850,7 @@
           <a:p>
             <a:fld id="{48A87A34-81AB-432B-8DAE-1953F412C126}" type="datetimeFigureOut">
               <a:rPr lang="en-US" dirty="0"/>
-              <a:t>10/15/2017</a:t>
+              <a:t>10/16/2017</a:t>
             </a:fld>
             <a:endParaRPr lang="en-US" dirty="0"/>
           </a:p>
@@ -5108,7 +5108,7 @@
           <a:p>
             <a:fld id="{48A87A34-81AB-432B-8DAE-1953F412C126}" type="datetimeFigureOut">
               <a:rPr lang="en-US" dirty="0"/>
-              <a:t>10/15/2017</a:t>
+              <a:t>10/16/2017</a:t>
             </a:fld>
             <a:endParaRPr lang="en-US" dirty="0"/>
           </a:p>
@@ -5537,7 +5537,7 @@
           <a:p>
             <a:fld id="{48A87A34-81AB-432B-8DAE-1953F412C126}" type="datetimeFigureOut">
               <a:rPr lang="en-US" dirty="0"/>
-              <a:t>10/15/2017</a:t>
+              <a:t>10/16/2017</a:t>
             </a:fld>
             <a:endParaRPr lang="en-US" dirty="0"/>
           </a:p>
@@ -6078,7 +6078,7 @@
           <a:p>
             <a:fld id="{48A87A34-81AB-432B-8DAE-1953F412C126}" type="datetimeFigureOut">
               <a:rPr lang="en-US" dirty="0"/>
-              <a:t>10/15/2017</a:t>
+              <a:t>10/16/2017</a:t>
             </a:fld>
             <a:endParaRPr lang="en-US" dirty="0"/>
           </a:p>
@@ -6793,7 +6793,7 @@
           <a:p>
             <a:fld id="{48A87A34-81AB-432B-8DAE-1953F412C126}" type="datetimeFigureOut">
               <a:rPr lang="en-US" dirty="0"/>
-              <a:t>10/15/2017</a:t>
+              <a:t>10/16/2017</a:t>
             </a:fld>
             <a:endParaRPr lang="en-US" dirty="0"/>
           </a:p>
@@ -6958,7 +6958,7 @@
           <a:p>
             <a:fld id="{48A87A34-81AB-432B-8DAE-1953F412C126}" type="datetimeFigureOut">
               <a:rPr lang="en-US" dirty="0"/>
-              <a:t>10/15/2017</a:t>
+              <a:t>10/16/2017</a:t>
             </a:fld>
             <a:endParaRPr lang="en-US" dirty="0"/>
           </a:p>
@@ -7133,7 +7133,7 @@
           <a:p>
             <a:fld id="{48A87A34-81AB-432B-8DAE-1953F412C126}" type="datetimeFigureOut">
               <a:rPr lang="en-US" dirty="0"/>
-              <a:t>10/15/2017</a:t>
+              <a:t>10/16/2017</a:t>
             </a:fld>
             <a:endParaRPr lang="en-US" dirty="0"/>
           </a:p>
@@ -7298,7 +7298,7 @@
           <a:p>
             <a:fld id="{48A87A34-81AB-432B-8DAE-1953F412C126}" type="datetimeFigureOut">
               <a:rPr lang="en-US" dirty="0"/>
-              <a:t>10/15/2017</a:t>
+              <a:t>10/16/2017</a:t>
             </a:fld>
             <a:endParaRPr lang="en-US" dirty="0"/>
           </a:p>
@@ -7543,7 +7543,7 @@
           <a:p>
             <a:fld id="{48A87A34-81AB-432B-8DAE-1953F412C126}" type="datetimeFigureOut">
               <a:rPr lang="en-US" dirty="0"/>
-              <a:t>10/15/2017</a:t>
+              <a:t>10/16/2017</a:t>
             </a:fld>
             <a:endParaRPr lang="en-US" dirty="0"/>
           </a:p>
@@ -7770,7 +7770,7 @@
           <a:p>
             <a:fld id="{48A87A34-81AB-432B-8DAE-1953F412C126}" type="datetimeFigureOut">
               <a:rPr lang="en-US" dirty="0"/>
-              <a:t>10/15/2017</a:t>
+              <a:t>10/16/2017</a:t>
             </a:fld>
             <a:endParaRPr lang="en-US" dirty="0"/>
           </a:p>
@@ -8146,7 +8146,7 @@
           <a:p>
             <a:fld id="{48A87A34-81AB-432B-8DAE-1953F412C126}" type="datetimeFigureOut">
               <a:rPr lang="en-US" dirty="0"/>
-              <a:t>10/15/2017</a:t>
+              <a:t>10/16/2017</a:t>
             </a:fld>
             <a:endParaRPr lang="en-US" dirty="0"/>
           </a:p>
@@ -8259,7 +8259,7 @@
           <a:p>
             <a:fld id="{48A87A34-81AB-432B-8DAE-1953F412C126}" type="datetimeFigureOut">
               <a:rPr lang="en-US" dirty="0"/>
-              <a:t>10/15/2017</a:t>
+              <a:t>10/16/2017</a:t>
             </a:fld>
             <a:endParaRPr lang="en-US" dirty="0"/>
           </a:p>
@@ -8349,7 +8349,7 @@
           <a:p>
             <a:fld id="{48A87A34-81AB-432B-8DAE-1953F412C126}" type="datetimeFigureOut">
               <a:rPr lang="en-US" dirty="0"/>
-              <a:t>10/15/2017</a:t>
+              <a:t>10/16/2017</a:t>
             </a:fld>
             <a:endParaRPr lang="en-US" dirty="0"/>
           </a:p>
@@ -8593,7 +8593,7 @@
           <a:p>
             <a:fld id="{48A87A34-81AB-432B-8DAE-1953F412C126}" type="datetimeFigureOut">
               <a:rPr lang="en-US" dirty="0"/>
-              <a:t>10/15/2017</a:t>
+              <a:t>10/16/2017</a:t>
             </a:fld>
             <a:endParaRPr lang="en-US" dirty="0"/>
           </a:p>
@@ -8868,7 +8868,7 @@
           <a:p>
             <a:fld id="{48A87A34-81AB-432B-8DAE-1953F412C126}" type="datetimeFigureOut">
               <a:rPr lang="en-US" dirty="0"/>
-              <a:t>10/15/2017</a:t>
+              <a:t>10/16/2017</a:t>
             </a:fld>
             <a:endParaRPr lang="en-US" dirty="0"/>
           </a:p>
@@ -8979,7 +8979,7 @@
           <a:noFill/>
           <a:extLst>
             <a:ext uri="{909E8E84-426E-40dd-AFC4-6F175D3DCCD1}">
-              <a14:hiddenFill xmlns="" xmlns:a14="http://schemas.microsoft.com/office/drawing/2010/main">
+              <a14:hiddenFill xmlns:a14="http://schemas.microsoft.com/office/drawing/2010/main" xmlns="">
                 <a:solidFill>
                   <a:srgbClr val="FFFFFF"/>
                 </a:solidFill>
@@ -9053,7 +9053,7 @@
               </a:ln>
               <a:extLst>
                 <a:ext uri="{91240B29-F687-4f45-9708-019B960494DF}">
-                  <a14:hiddenLine xmlns="" xmlns:a14="http://schemas.microsoft.com/office/drawing/2010/main" w="9525">
+                  <a14:hiddenLine xmlns:a14="http://schemas.microsoft.com/office/drawing/2010/main" xmlns="" w="9525">
                     <a:solidFill>
                       <a:srgbClr val="000000"/>
                     </a:solidFill>
@@ -9143,7 +9143,7 @@
               </a:ln>
               <a:extLst>
                 <a:ext uri="{91240B29-F687-4f45-9708-019B960494DF}">
-                  <a14:hiddenLine xmlns="" xmlns:a14="http://schemas.microsoft.com/office/drawing/2010/main" w="9525">
+                  <a14:hiddenLine xmlns:a14="http://schemas.microsoft.com/office/drawing/2010/main" xmlns="" w="9525">
                     <a:solidFill>
                       <a:srgbClr val="000000"/>
                     </a:solidFill>
@@ -9233,7 +9233,7 @@
               </a:ln>
               <a:extLst>
                 <a:ext uri="{91240B29-F687-4f45-9708-019B960494DF}">
-                  <a14:hiddenLine xmlns="" xmlns:a14="http://schemas.microsoft.com/office/drawing/2010/main" w="9525">
+                  <a14:hiddenLine xmlns:a14="http://schemas.microsoft.com/office/drawing/2010/main" xmlns="" w="9525">
                     <a:solidFill>
                       <a:srgbClr val="000000"/>
                     </a:solidFill>
@@ -9295,7 +9295,7 @@
               </a:ln>
               <a:extLst>
                 <a:ext uri="{91240B29-F687-4f45-9708-019B960494DF}">
-                  <a14:hiddenLine xmlns="" xmlns:a14="http://schemas.microsoft.com/office/drawing/2010/main" w="9525">
+                  <a14:hiddenLine xmlns:a14="http://schemas.microsoft.com/office/drawing/2010/main" xmlns="" w="9525">
                     <a:solidFill>
                       <a:srgbClr val="000000"/>
                     </a:solidFill>
@@ -9385,7 +9385,7 @@
               </a:ln>
               <a:extLst>
                 <a:ext uri="{91240B29-F687-4f45-9708-019B960494DF}">
-                  <a14:hiddenLine xmlns="" xmlns:a14="http://schemas.microsoft.com/office/drawing/2010/main" w="9525">
+                  <a14:hiddenLine xmlns:a14="http://schemas.microsoft.com/office/drawing/2010/main" xmlns="" w="9525">
                     <a:solidFill>
                       <a:srgbClr val="000000"/>
                     </a:solidFill>
@@ -9447,7 +9447,7 @@
               </a:ln>
               <a:extLst>
                 <a:ext uri="{91240B29-F687-4f45-9708-019B960494DF}">
-                  <a14:hiddenLine xmlns="" xmlns:a14="http://schemas.microsoft.com/office/drawing/2010/main" w="9525">
+                  <a14:hiddenLine xmlns:a14="http://schemas.microsoft.com/office/drawing/2010/main" xmlns="" w="9525">
                     <a:solidFill>
                       <a:srgbClr val="000000"/>
                     </a:solidFill>
@@ -9509,7 +9509,7 @@
               </a:ln>
               <a:extLst>
                 <a:ext uri="{91240B29-F687-4f45-9708-019B960494DF}">
-                  <a14:hiddenLine xmlns="" xmlns:a14="http://schemas.microsoft.com/office/drawing/2010/main" w="9525">
+                  <a14:hiddenLine xmlns:a14="http://schemas.microsoft.com/office/drawing/2010/main" xmlns="" w="9525">
                     <a:solidFill>
                       <a:srgbClr val="000000"/>
                     </a:solidFill>
@@ -9599,7 +9599,7 @@
               </a:ln>
               <a:extLst>
                 <a:ext uri="{91240B29-F687-4f45-9708-019B960494DF}">
-                  <a14:hiddenLine xmlns="" xmlns:a14="http://schemas.microsoft.com/office/drawing/2010/main" w="9525">
+                  <a14:hiddenLine xmlns:a14="http://schemas.microsoft.com/office/drawing/2010/main" xmlns="" w="9525">
                     <a:solidFill>
                       <a:srgbClr val="000000"/>
                     </a:solidFill>
@@ -9689,7 +9689,7 @@
               </a:ln>
               <a:extLst>
                 <a:ext uri="{91240B29-F687-4f45-9708-019B960494DF}">
-                  <a14:hiddenLine xmlns="" xmlns:a14="http://schemas.microsoft.com/office/drawing/2010/main" w="9525">
+                  <a14:hiddenLine xmlns:a14="http://schemas.microsoft.com/office/drawing/2010/main" xmlns="" w="9525">
                     <a:solidFill>
                       <a:srgbClr val="000000"/>
                     </a:solidFill>
@@ -9751,7 +9751,7 @@
               </a:ln>
               <a:extLst>
                 <a:ext uri="{91240B29-F687-4f45-9708-019B960494DF}">
-                  <a14:hiddenLine xmlns="" xmlns:a14="http://schemas.microsoft.com/office/drawing/2010/main" w="9525">
+                  <a14:hiddenLine xmlns:a14="http://schemas.microsoft.com/office/drawing/2010/main" xmlns="" w="9525">
                     <a:solidFill>
                       <a:srgbClr val="000000"/>
                     </a:solidFill>
@@ -9861,7 +9861,7 @@
               </a:ln>
               <a:extLst>
                 <a:ext uri="{91240B29-F687-4f45-9708-019B960494DF}">
-                  <a14:hiddenLine xmlns="" xmlns:a14="http://schemas.microsoft.com/office/drawing/2010/main" w="9525">
+                  <a14:hiddenLine xmlns:a14="http://schemas.microsoft.com/office/drawing/2010/main" xmlns="" w="9525">
                     <a:solidFill>
                       <a:srgbClr val="000000"/>
                     </a:solidFill>
@@ -9945,7 +9945,7 @@
               </a:ln>
               <a:extLst>
                 <a:ext uri="{91240B29-F687-4f45-9708-019B960494DF}">
-                  <a14:hiddenLine xmlns="" xmlns:a14="http://schemas.microsoft.com/office/drawing/2010/main" w="9525">
+                  <a14:hiddenLine xmlns:a14="http://schemas.microsoft.com/office/drawing/2010/main" xmlns="" w="9525">
                     <a:solidFill>
                       <a:srgbClr val="000000"/>
                     </a:solidFill>
@@ -10007,7 +10007,7 @@
               </a:ln>
               <a:extLst>
                 <a:ext uri="{91240B29-F687-4f45-9708-019B960494DF}">
-                  <a14:hiddenLine xmlns="" xmlns:a14="http://schemas.microsoft.com/office/drawing/2010/main" w="9525">
+                  <a14:hiddenLine xmlns:a14="http://schemas.microsoft.com/office/drawing/2010/main" xmlns="" w="9525">
                     <a:solidFill>
                       <a:srgbClr val="000000"/>
                     </a:solidFill>
@@ -10069,7 +10069,7 @@
               </a:ln>
               <a:extLst>
                 <a:ext uri="{91240B29-F687-4f45-9708-019B960494DF}">
-                  <a14:hiddenLine xmlns="" xmlns:a14="http://schemas.microsoft.com/office/drawing/2010/main" w="9525">
+                  <a14:hiddenLine xmlns:a14="http://schemas.microsoft.com/office/drawing/2010/main" xmlns="" w="9525">
                     <a:solidFill>
                       <a:srgbClr val="000000"/>
                     </a:solidFill>
@@ -10159,7 +10159,7 @@
               </a:ln>
               <a:extLst>
                 <a:ext uri="{91240B29-F687-4f45-9708-019B960494DF}">
-                  <a14:hiddenLine xmlns="" xmlns:a14="http://schemas.microsoft.com/office/drawing/2010/main" w="9525">
+                  <a14:hiddenLine xmlns:a14="http://schemas.microsoft.com/office/drawing/2010/main" xmlns="" w="9525">
                     <a:solidFill>
                       <a:srgbClr val="000000"/>
                     </a:solidFill>
@@ -10193,7 +10193,7 @@
               </a:ln>
               <a:extLst>
                 <a:ext uri="{91240B29-F687-4f45-9708-019B960494DF}">
-                  <a14:hiddenLine xmlns="" xmlns:a14="http://schemas.microsoft.com/office/drawing/2010/main" w="9525">
+                  <a14:hiddenLine xmlns:a14="http://schemas.microsoft.com/office/drawing/2010/main" xmlns="" w="9525">
                     <a:solidFill>
                       <a:srgbClr val="000000"/>
                     </a:solidFill>
@@ -10258,7 +10258,7 @@
               </a:ln>
               <a:extLst>
                 <a:ext uri="{91240B29-F687-4f45-9708-019B960494DF}">
-                  <a14:hiddenLine xmlns="" xmlns:a14="http://schemas.microsoft.com/office/drawing/2010/main" w="9525">
+                  <a14:hiddenLine xmlns:a14="http://schemas.microsoft.com/office/drawing/2010/main" xmlns="" w="9525">
                     <a:solidFill>
                       <a:srgbClr val="000000"/>
                     </a:solidFill>
@@ -10348,7 +10348,7 @@
               </a:ln>
               <a:extLst>
                 <a:ext uri="{91240B29-F687-4f45-9708-019B960494DF}">
-                  <a14:hiddenLine xmlns="" xmlns:a14="http://schemas.microsoft.com/office/drawing/2010/main" w="9525">
+                  <a14:hiddenLine xmlns:a14="http://schemas.microsoft.com/office/drawing/2010/main" xmlns="" w="9525">
                     <a:solidFill>
                       <a:srgbClr val="000000"/>
                     </a:solidFill>
@@ -10410,7 +10410,7 @@
               </a:ln>
               <a:extLst>
                 <a:ext uri="{91240B29-F687-4f45-9708-019B960494DF}">
-                  <a14:hiddenLine xmlns="" xmlns:a14="http://schemas.microsoft.com/office/drawing/2010/main" w="9525">
+                  <a14:hiddenLine xmlns:a14="http://schemas.microsoft.com/office/drawing/2010/main" xmlns="" w="9525">
                     <a:solidFill>
                       <a:srgbClr val="000000"/>
                     </a:solidFill>
@@ -10500,7 +10500,7 @@
               </a:ln>
               <a:extLst>
                 <a:ext uri="{91240B29-F687-4f45-9708-019B960494DF}">
-                  <a14:hiddenLine xmlns="" xmlns:a14="http://schemas.microsoft.com/office/drawing/2010/main" w="9525">
+                  <a14:hiddenLine xmlns:a14="http://schemas.microsoft.com/office/drawing/2010/main" xmlns="" w="9525">
                     <a:solidFill>
                       <a:srgbClr val="000000"/>
                     </a:solidFill>
@@ -10565,7 +10565,7 @@
               </a:ln>
               <a:extLst>
                 <a:ext uri="{91240B29-F687-4f45-9708-019B960494DF}">
-                  <a14:hiddenLine xmlns="" xmlns:a14="http://schemas.microsoft.com/office/drawing/2010/main" w="9525">
+                  <a14:hiddenLine xmlns:a14="http://schemas.microsoft.com/office/drawing/2010/main" xmlns="" w="9525">
                     <a:solidFill>
                       <a:srgbClr val="000000"/>
                     </a:solidFill>
@@ -10627,7 +10627,7 @@
               </a:ln>
               <a:extLst>
                 <a:ext uri="{91240B29-F687-4f45-9708-019B960494DF}">
-                  <a14:hiddenLine xmlns="" xmlns:a14="http://schemas.microsoft.com/office/drawing/2010/main" w="9525">
+                  <a14:hiddenLine xmlns:a14="http://schemas.microsoft.com/office/drawing/2010/main" xmlns="" w="9525">
                     <a:solidFill>
                       <a:srgbClr val="000000"/>
                     </a:solidFill>
@@ -10717,7 +10717,7 @@
               </a:ln>
               <a:extLst>
                 <a:ext uri="{91240B29-F687-4f45-9708-019B960494DF}">
-                  <a14:hiddenLine xmlns="" xmlns:a14="http://schemas.microsoft.com/office/drawing/2010/main" w="9525">
+                  <a14:hiddenLine xmlns:a14="http://schemas.microsoft.com/office/drawing/2010/main" xmlns="" w="9525">
                     <a:solidFill>
                       <a:srgbClr val="000000"/>
                     </a:solidFill>
@@ -10807,7 +10807,7 @@
               </a:ln>
               <a:extLst>
                 <a:ext uri="{91240B29-F687-4f45-9708-019B960494DF}">
-                  <a14:hiddenLine xmlns="" xmlns:a14="http://schemas.microsoft.com/office/drawing/2010/main" w="9525">
+                  <a14:hiddenLine xmlns:a14="http://schemas.microsoft.com/office/drawing/2010/main" xmlns="" w="9525">
                     <a:solidFill>
                       <a:srgbClr val="000000"/>
                     </a:solidFill>
@@ -10872,7 +10872,7 @@
               </a:ln>
               <a:extLst>
                 <a:ext uri="{91240B29-F687-4f45-9708-019B960494DF}">
-                  <a14:hiddenLine xmlns="" xmlns:a14="http://schemas.microsoft.com/office/drawing/2010/main" w="9525">
+                  <a14:hiddenLine xmlns:a14="http://schemas.microsoft.com/office/drawing/2010/main" xmlns="" w="9525">
                     <a:solidFill>
                       <a:srgbClr val="000000"/>
                     </a:solidFill>
@@ -10992,7 +10992,7 @@
               </a:ln>
               <a:extLst>
                 <a:ext uri="{91240B29-F687-4f45-9708-019B960494DF}">
-                  <a14:hiddenLine xmlns="" xmlns:a14="http://schemas.microsoft.com/office/drawing/2010/main" w="9525">
+                  <a14:hiddenLine xmlns:a14="http://schemas.microsoft.com/office/drawing/2010/main" xmlns="" w="9525">
                     <a:solidFill>
                       <a:srgbClr val="000000"/>
                     </a:solidFill>
@@ -11090,7 +11090,7 @@
               </a:ln>
               <a:extLst>
                 <a:ext uri="{91240B29-F687-4f45-9708-019B960494DF}">
-                  <a14:hiddenLine xmlns="" xmlns:a14="http://schemas.microsoft.com/office/drawing/2010/main" w="9525">
+                  <a14:hiddenLine xmlns:a14="http://schemas.microsoft.com/office/drawing/2010/main" xmlns="" w="9525">
                     <a:solidFill>
                       <a:srgbClr val="000000"/>
                     </a:solidFill>
@@ -11205,7 +11205,7 @@
               </a:ln>
               <a:extLst>
                 <a:ext uri="{91240B29-F687-4f45-9708-019B960494DF}">
-                  <a14:hiddenLine xmlns="" xmlns:a14="http://schemas.microsoft.com/office/drawing/2010/main" w="9525">
+                  <a14:hiddenLine xmlns:a14="http://schemas.microsoft.com/office/drawing/2010/main" xmlns="" w="9525">
                     <a:solidFill>
                       <a:srgbClr val="000000"/>
                     </a:solidFill>
@@ -11295,7 +11295,7 @@
               </a:ln>
               <a:extLst>
                 <a:ext uri="{91240B29-F687-4f45-9708-019B960494DF}">
-                  <a14:hiddenLine xmlns="" xmlns:a14="http://schemas.microsoft.com/office/drawing/2010/main" w="9525">
+                  <a14:hiddenLine xmlns:a14="http://schemas.microsoft.com/office/drawing/2010/main" xmlns="" w="9525">
                     <a:solidFill>
                       <a:srgbClr val="000000"/>
                     </a:solidFill>
@@ -11360,7 +11360,7 @@
               </a:ln>
               <a:extLst>
                 <a:ext uri="{91240B29-F687-4f45-9708-019B960494DF}">
-                  <a14:hiddenLine xmlns="" xmlns:a14="http://schemas.microsoft.com/office/drawing/2010/main" w="9525">
+                  <a14:hiddenLine xmlns:a14="http://schemas.microsoft.com/office/drawing/2010/main" xmlns="" w="9525">
                     <a:solidFill>
                       <a:srgbClr val="000000"/>
                     </a:solidFill>
@@ -11450,7 +11450,7 @@
               </a:ln>
               <a:extLst>
                 <a:ext uri="{91240B29-F687-4f45-9708-019B960494DF}">
-                  <a14:hiddenLine xmlns="" xmlns:a14="http://schemas.microsoft.com/office/drawing/2010/main" w="9525">
+                  <a14:hiddenLine xmlns:a14="http://schemas.microsoft.com/office/drawing/2010/main" xmlns="" w="9525">
                     <a:solidFill>
                       <a:srgbClr val="000000"/>
                     </a:solidFill>
@@ -11518,7 +11518,7 @@
               </a:ln>
               <a:extLst>
                 <a:ext uri="{91240B29-F687-4f45-9708-019B960494DF}">
-                  <a14:hiddenLine xmlns="" xmlns:a14="http://schemas.microsoft.com/office/drawing/2010/main" w="9525">
+                  <a14:hiddenLine xmlns:a14="http://schemas.microsoft.com/office/drawing/2010/main" xmlns="" w="9525">
                     <a:solidFill>
                       <a:srgbClr val="000000"/>
                     </a:solidFill>
@@ -11608,7 +11608,7 @@
               </a:ln>
               <a:extLst>
                 <a:ext uri="{91240B29-F687-4f45-9708-019B960494DF}">
-                  <a14:hiddenLine xmlns="" xmlns:a14="http://schemas.microsoft.com/office/drawing/2010/main" w="9525">
+                  <a14:hiddenLine xmlns:a14="http://schemas.microsoft.com/office/drawing/2010/main" xmlns="" w="9525">
                     <a:solidFill>
                       <a:srgbClr val="000000"/>
                     </a:solidFill>
@@ -11676,7 +11676,7 @@
               </a:ln>
               <a:extLst>
                 <a:ext uri="{91240B29-F687-4f45-9708-019B960494DF}">
-                  <a14:hiddenLine xmlns="" xmlns:a14="http://schemas.microsoft.com/office/drawing/2010/main" w="9525">
+                  <a14:hiddenLine xmlns:a14="http://schemas.microsoft.com/office/drawing/2010/main" xmlns="" w="9525">
                     <a:solidFill>
                       <a:srgbClr val="000000"/>
                     </a:solidFill>
@@ -11766,7 +11766,7 @@
               </a:ln>
               <a:extLst>
                 <a:ext uri="{91240B29-F687-4f45-9708-019B960494DF}">
-                  <a14:hiddenLine xmlns="" xmlns:a14="http://schemas.microsoft.com/office/drawing/2010/main" w="9525">
+                  <a14:hiddenLine xmlns:a14="http://schemas.microsoft.com/office/drawing/2010/main" xmlns="" w="9525">
                     <a:solidFill>
                       <a:srgbClr val="000000"/>
                     </a:solidFill>
@@ -11800,7 +11800,7 @@
               </a:ln>
               <a:extLst>
                 <a:ext uri="{91240B29-F687-4f45-9708-019B960494DF}">
-                  <a14:hiddenLine xmlns="" xmlns:a14="http://schemas.microsoft.com/office/drawing/2010/main" w="9525">
+                  <a14:hiddenLine xmlns:a14="http://schemas.microsoft.com/office/drawing/2010/main" xmlns="" w="9525">
                     <a:solidFill>
                       <a:srgbClr val="000000"/>
                     </a:solidFill>
@@ -11941,7 +11941,7 @@
             <a:fld id="{48A87A34-81AB-432B-8DAE-1953F412C126}" type="datetimeFigureOut">
               <a:rPr lang="en-US" dirty="0"/>
               <a:pPr/>
-              <a:t>10/15/2017</a:t>
+              <a:t>10/16/2017</a:t>
             </a:fld>
             <a:endParaRPr lang="en-US" dirty="0"/>
           </a:p>
@@ -12814,7 +12814,12 @@
             <p:ph idx="1"/>
           </p:nvPr>
         </p:nvSpPr>
-        <p:spPr/>
+        <p:spPr>
+          <a:xfrm>
+            <a:off x="1141412" y="1832237"/>
+            <a:ext cx="4735605" cy="3541714"/>
+          </a:xfrm>
+        </p:spPr>
         <p:txBody>
           <a:bodyPr/>
           <a:lstStyle/>
@@ -12838,6 +12843,36 @@
           </a:p>
         </p:txBody>
       </p:sp>
+      <p:pic>
+        <p:nvPicPr>
+          <p:cNvPr id="4" name="Picture 3">
+            <a:extLst>
+              <a:ext uri="{FF2B5EF4-FFF2-40B4-BE49-F238E27FC236}">
+                <a16:creationId xmlns:a16="http://schemas.microsoft.com/office/drawing/2014/main" id="{2DADCBC1-C540-4DFB-820D-B4410F53C9BC}"/>
+              </a:ext>
+            </a:extLst>
+          </p:cNvPr>
+          <p:cNvPicPr>
+            <a:picLocks noChangeAspect="1"/>
+          </p:cNvPicPr>
+          <p:nvPr/>
+        </p:nvPicPr>
+        <p:blipFill>
+          <a:blip r:embed="rId2"/>
+          <a:stretch>
+            <a:fillRect/>
+          </a:stretch>
+        </p:blipFill>
+        <p:spPr>
+          <a:xfrm>
+            <a:off x="6094412" y="1832237"/>
+            <a:ext cx="4762978" cy="2473433"/>
+          </a:xfrm>
+          <a:prstGeom prst="rect">
+            <a:avLst/>
+          </a:prstGeom>
+        </p:spPr>
+      </p:pic>
     </p:spTree>
     <p:extLst>
       <p:ext uri="{BB962C8B-B14F-4D97-AF65-F5344CB8AC3E}">
@@ -13049,31 +13084,55 @@
           </a:p>
         </p:txBody>
       </p:sp>
-      <p:sp>
-        <p:nvSpPr>
-          <p:cNvPr id="3" name="Content Placeholder 2">
+      <p:pic>
+        <p:nvPicPr>
+          <p:cNvPr id="1026" name="Picture 2" descr="Image result for demo">
             <a:extLst>
               <a:ext uri="{FF2B5EF4-FFF2-40B4-BE49-F238E27FC236}">
-                <a16:creationId xmlns:a16="http://schemas.microsoft.com/office/drawing/2014/main" id="{F7E53A00-7F7D-4CC3-9C4E-F11517E49637}"/>
+                <a16:creationId xmlns:a16="http://schemas.microsoft.com/office/drawing/2014/main" id="{FBA94365-C079-468E-B4AA-6E3FC5303A62}"/>
               </a:ext>
             </a:extLst>
           </p:cNvPr>
-          <p:cNvSpPr>
-            <a:spLocks noGrp="1"/>
-          </p:cNvSpPr>
+          <p:cNvPicPr>
+            <a:picLocks noGrp="1" noChangeAspect="1" noChangeArrowheads="1"/>
+          </p:cNvPicPr>
           <p:nvPr>
             <p:ph idx="1"/>
           </p:nvPr>
-        </p:nvSpPr>
-        <p:spPr/>
-        <p:txBody>
-          <a:bodyPr/>
-          <a:lstStyle/>
-          <a:p>
-            <a:endParaRPr lang="en-CA"/>
-          </a:p>
-        </p:txBody>
-      </p:sp>
+        </p:nvPicPr>
+        <p:blipFill>
+          <a:blip r:embed="rId2">
+            <a:extLst>
+              <a:ext uri="{28A0092B-C50C-407E-A947-70E740481C1C}">
+                <a14:useLocalDpi xmlns:a14="http://schemas.microsoft.com/office/drawing/2010/main" val="0"/>
+              </a:ext>
+            </a:extLst>
+          </a:blip>
+          <a:srcRect/>
+          <a:stretch>
+            <a:fillRect/>
+          </a:stretch>
+        </p:blipFill>
+        <p:spPr bwMode="auto">
+          <a:xfrm>
+            <a:off x="3240350" y="1737094"/>
+            <a:ext cx="5067633" cy="4054106"/>
+          </a:xfrm>
+          <a:prstGeom prst="rect">
+            <a:avLst/>
+          </a:prstGeom>
+          <a:noFill/>
+          <a:extLst>
+            <a:ext uri="{909E8E84-426E-40DD-AFC4-6F175D3DCCD1}">
+              <a14:hiddenFill xmlns:a14="http://schemas.microsoft.com/office/drawing/2010/main">
+                <a:solidFill>
+                  <a:srgbClr val="FFFFFF"/>
+                </a:solidFill>
+              </a14:hiddenFill>
+            </a:ext>
+          </a:extLst>
+        </p:spPr>
+      </p:pic>
     </p:spTree>
     <p:extLst>
       <p:ext uri="{BB962C8B-B14F-4D97-AF65-F5344CB8AC3E}">

</xml_diff>